<commit_message>
working on linear models and going to change variables to ensure 0,1 dummy variable structure across the board.
</commit_message>
<xml_diff>
--- a/Presentation/Graphics.pptx
+++ b/Presentation/Graphics.pptx
@@ -107,6 +107,11 @@
       </a:defRPr>
     </a:lvl9pPr>
   </p:defaultTextStyle>
+  <p:extLst>
+    <p:ext uri="{EFAFB233-063F-42B5-8137-9DF3F51BA10A}">
+      <p15:sldGuideLst xmlns:p15="http://schemas.microsoft.com/office/powerpoint/2012/main"/>
+    </p:ext>
+  </p:extLst>
 </p:presentation>
 </file>
 
@@ -6521,7 +6526,7 @@
           <a:p>
             <a:fld id="{E19C155D-4B10-5E41-8252-2B908C667BAC}" type="datetimeFigureOut">
               <a:rPr lang="en-US" smtClean="0"/>
-              <a:t>1/16/22</a:t>
+              <a:t>1/31/22</a:t>
             </a:fld>
             <a:endParaRPr lang="en-US"/>
           </a:p>
@@ -6719,7 +6724,7 @@
           <a:p>
             <a:fld id="{E19C155D-4B10-5E41-8252-2B908C667BAC}" type="datetimeFigureOut">
               <a:rPr lang="en-US" smtClean="0"/>
-              <a:t>1/16/22</a:t>
+              <a:t>1/31/22</a:t>
             </a:fld>
             <a:endParaRPr lang="en-US"/>
           </a:p>
@@ -6927,7 +6932,7 @@
           <a:p>
             <a:fld id="{E19C155D-4B10-5E41-8252-2B908C667BAC}" type="datetimeFigureOut">
               <a:rPr lang="en-US" smtClean="0"/>
-              <a:t>1/16/22</a:t>
+              <a:t>1/31/22</a:t>
             </a:fld>
             <a:endParaRPr lang="en-US"/>
           </a:p>
@@ -7125,7 +7130,7 @@
           <a:p>
             <a:fld id="{E19C155D-4B10-5E41-8252-2B908C667BAC}" type="datetimeFigureOut">
               <a:rPr lang="en-US" smtClean="0"/>
-              <a:t>1/16/22</a:t>
+              <a:t>1/31/22</a:t>
             </a:fld>
             <a:endParaRPr lang="en-US"/>
           </a:p>
@@ -7400,7 +7405,7 @@
           <a:p>
             <a:fld id="{E19C155D-4B10-5E41-8252-2B908C667BAC}" type="datetimeFigureOut">
               <a:rPr lang="en-US" smtClean="0"/>
-              <a:t>1/16/22</a:t>
+              <a:t>1/31/22</a:t>
             </a:fld>
             <a:endParaRPr lang="en-US"/>
           </a:p>
@@ -7665,7 +7670,7 @@
           <a:p>
             <a:fld id="{E19C155D-4B10-5E41-8252-2B908C667BAC}" type="datetimeFigureOut">
               <a:rPr lang="en-US" smtClean="0"/>
-              <a:t>1/16/22</a:t>
+              <a:t>1/31/22</a:t>
             </a:fld>
             <a:endParaRPr lang="en-US"/>
           </a:p>
@@ -8077,7 +8082,7 @@
           <a:p>
             <a:fld id="{E19C155D-4B10-5E41-8252-2B908C667BAC}" type="datetimeFigureOut">
               <a:rPr lang="en-US" smtClean="0"/>
-              <a:t>1/16/22</a:t>
+              <a:t>1/31/22</a:t>
             </a:fld>
             <a:endParaRPr lang="en-US"/>
           </a:p>
@@ -8218,7 +8223,7 @@
           <a:p>
             <a:fld id="{E19C155D-4B10-5E41-8252-2B908C667BAC}" type="datetimeFigureOut">
               <a:rPr lang="en-US" smtClean="0"/>
-              <a:t>1/16/22</a:t>
+              <a:t>1/31/22</a:t>
             </a:fld>
             <a:endParaRPr lang="en-US"/>
           </a:p>
@@ -8331,7 +8336,7 @@
           <a:p>
             <a:fld id="{E19C155D-4B10-5E41-8252-2B908C667BAC}" type="datetimeFigureOut">
               <a:rPr lang="en-US" smtClean="0"/>
-              <a:t>1/16/22</a:t>
+              <a:t>1/31/22</a:t>
             </a:fld>
             <a:endParaRPr lang="en-US"/>
           </a:p>
@@ -8642,7 +8647,7 @@
           <a:p>
             <a:fld id="{E19C155D-4B10-5E41-8252-2B908C667BAC}" type="datetimeFigureOut">
               <a:rPr lang="en-US" smtClean="0"/>
-              <a:t>1/16/22</a:t>
+              <a:t>1/31/22</a:t>
             </a:fld>
             <a:endParaRPr lang="en-US"/>
           </a:p>
@@ -8930,7 +8935,7 @@
           <a:p>
             <a:fld id="{E19C155D-4B10-5E41-8252-2B908C667BAC}" type="datetimeFigureOut">
               <a:rPr lang="en-US" smtClean="0"/>
-              <a:t>1/16/22</a:t>
+              <a:t>1/31/22</a:t>
             </a:fld>
             <a:endParaRPr lang="en-US"/>
           </a:p>
@@ -9171,7 +9176,7 @@
           <a:p>
             <a:fld id="{E19C155D-4B10-5E41-8252-2B908C667BAC}" type="datetimeFigureOut">
               <a:rPr lang="en-US" smtClean="0"/>
-              <a:t>1/16/22</a:t>
+              <a:t>1/31/22</a:t>
             </a:fld>
             <a:endParaRPr lang="en-US"/>
           </a:p>
@@ -9688,7 +9693,7 @@
               <a:pPr algn="ctr"/>
               <a:r>
                 <a:rPr lang="en-US" dirty="0"/>
-                <a:t>Close Father Named</a:t>
+                <a:t>Close Father Named (1)</a:t>
               </a:r>
             </a:p>
           </p:txBody>
@@ -9794,7 +9799,7 @@
               <a:pPr algn="ctr"/>
               <a:r>
                 <a:rPr lang="en-US" dirty="0"/>
-                <a:t>Non-Close Father Named</a:t>
+                <a:t>Non-Close Father Named (2)</a:t>
               </a:r>
             </a:p>
           </p:txBody>
@@ -9900,7 +9905,7 @@
               <a:pPr algn="ctr"/>
               <a:r>
                 <a:rPr lang="en-US" dirty="0"/>
-                <a:t>Father Not Named</a:t>
+                <a:t>Father Not Named (0)</a:t>
               </a:r>
             </a:p>
           </p:txBody>

</xml_diff>